<commit_message>
Save icons in power point
</commit_message>
<xml_diff>
--- a/src/QSviz/resources/icons.pptx
+++ b/src/QSviz/resources/icons.pptx
@@ -261,7 +261,7 @@
           <a:p>
             <a:fld id="{972982F3-053C-7B4D-A5CF-EFE18F3D02A0}" type="datetimeFigureOut">
               <a:rPr lang="en-US" smtClean="0"/>
-              <a:t>10/6/25</a:t>
+              <a:t>10/7/25</a:t>
             </a:fld>
             <a:endParaRPr lang="en-US"/>
           </a:p>
@@ -459,7 +459,7 @@
           <a:p>
             <a:fld id="{972982F3-053C-7B4D-A5CF-EFE18F3D02A0}" type="datetimeFigureOut">
               <a:rPr lang="en-US" smtClean="0"/>
-              <a:t>10/6/25</a:t>
+              <a:t>10/7/25</a:t>
             </a:fld>
             <a:endParaRPr lang="en-US"/>
           </a:p>
@@ -667,7 +667,7 @@
           <a:p>
             <a:fld id="{972982F3-053C-7B4D-A5CF-EFE18F3D02A0}" type="datetimeFigureOut">
               <a:rPr lang="en-US" smtClean="0"/>
-              <a:t>10/6/25</a:t>
+              <a:t>10/7/25</a:t>
             </a:fld>
             <a:endParaRPr lang="en-US"/>
           </a:p>
@@ -865,7 +865,7 @@
           <a:p>
             <a:fld id="{972982F3-053C-7B4D-A5CF-EFE18F3D02A0}" type="datetimeFigureOut">
               <a:rPr lang="en-US" smtClean="0"/>
-              <a:t>10/6/25</a:t>
+              <a:t>10/7/25</a:t>
             </a:fld>
             <a:endParaRPr lang="en-US"/>
           </a:p>
@@ -1140,7 +1140,7 @@
           <a:p>
             <a:fld id="{972982F3-053C-7B4D-A5CF-EFE18F3D02A0}" type="datetimeFigureOut">
               <a:rPr lang="en-US" smtClean="0"/>
-              <a:t>10/6/25</a:t>
+              <a:t>10/7/25</a:t>
             </a:fld>
             <a:endParaRPr lang="en-US"/>
           </a:p>
@@ -1405,7 +1405,7 @@
           <a:p>
             <a:fld id="{972982F3-053C-7B4D-A5CF-EFE18F3D02A0}" type="datetimeFigureOut">
               <a:rPr lang="en-US" smtClean="0"/>
-              <a:t>10/6/25</a:t>
+              <a:t>10/7/25</a:t>
             </a:fld>
             <a:endParaRPr lang="en-US"/>
           </a:p>
@@ -1817,7 +1817,7 @@
           <a:p>
             <a:fld id="{972982F3-053C-7B4D-A5CF-EFE18F3D02A0}" type="datetimeFigureOut">
               <a:rPr lang="en-US" smtClean="0"/>
-              <a:t>10/6/25</a:t>
+              <a:t>10/7/25</a:t>
             </a:fld>
             <a:endParaRPr lang="en-US"/>
           </a:p>
@@ -1958,7 +1958,7 @@
           <a:p>
             <a:fld id="{972982F3-053C-7B4D-A5CF-EFE18F3D02A0}" type="datetimeFigureOut">
               <a:rPr lang="en-US" smtClean="0"/>
-              <a:t>10/6/25</a:t>
+              <a:t>10/7/25</a:t>
             </a:fld>
             <a:endParaRPr lang="en-US"/>
           </a:p>
@@ -2071,7 +2071,7 @@
           <a:p>
             <a:fld id="{972982F3-053C-7B4D-A5CF-EFE18F3D02A0}" type="datetimeFigureOut">
               <a:rPr lang="en-US" smtClean="0"/>
-              <a:t>10/6/25</a:t>
+              <a:t>10/7/25</a:t>
             </a:fld>
             <a:endParaRPr lang="en-US"/>
           </a:p>
@@ -2382,7 +2382,7 @@
           <a:p>
             <a:fld id="{972982F3-053C-7B4D-A5CF-EFE18F3D02A0}" type="datetimeFigureOut">
               <a:rPr lang="en-US" smtClean="0"/>
-              <a:t>10/6/25</a:t>
+              <a:t>10/7/25</a:t>
             </a:fld>
             <a:endParaRPr lang="en-US"/>
           </a:p>
@@ -2670,7 +2670,7 @@
           <a:p>
             <a:fld id="{972982F3-053C-7B4D-A5CF-EFE18F3D02A0}" type="datetimeFigureOut">
               <a:rPr lang="en-US" smtClean="0"/>
-              <a:t>10/6/25</a:t>
+              <a:t>10/7/25</a:t>
             </a:fld>
             <a:endParaRPr lang="en-US"/>
           </a:p>
@@ -2911,7 +2911,7 @@
           <a:p>
             <a:fld id="{972982F3-053C-7B4D-A5CF-EFE18F3D02A0}" type="datetimeFigureOut">
               <a:rPr lang="en-US" smtClean="0"/>
-              <a:t>10/6/25</a:t>
+              <a:t>10/7/25</a:t>
             </a:fld>
             <a:endParaRPr lang="en-US"/>
           </a:p>
@@ -6151,7 +6151,7 @@
         </p:blipFill>
         <p:spPr>
           <a:xfrm>
-            <a:off x="9849159" y="2483707"/>
+            <a:off x="8695450" y="2454875"/>
             <a:ext cx="914400" cy="914400"/>
           </a:xfrm>
           <a:prstGeom prst="rect">
@@ -6159,6 +6159,346 @@
           </a:prstGeom>
         </p:spPr>
       </p:pic>
+      <p:pic>
+        <p:nvPicPr>
+          <p:cNvPr id="2" name="Graphic 1" descr="Eraser with solid fill">
+            <a:extLst>
+              <a:ext uri="{FF2B5EF4-FFF2-40B4-BE49-F238E27FC236}">
+                <a16:creationId xmlns:a16="http://schemas.microsoft.com/office/drawing/2014/main" id="{E3904450-5E70-4B05-3D94-3A9605915BF4}"/>
+              </a:ext>
+            </a:extLst>
+          </p:cNvPr>
+          <p:cNvPicPr>
+            <a:picLocks noChangeAspect="1"/>
+          </p:cNvPicPr>
+          <p:nvPr/>
+        </p:nvPicPr>
+        <p:blipFill>
+          <a:blip r:embed="rId21">
+            <a:extLst>
+              <a:ext uri="{96DAC541-7B7A-43D3-8B79-37D633B846F1}">
+                <asvg:svgBlip xmlns:asvg="http://schemas.microsoft.com/office/drawing/2016/SVG/main" r:embed="rId22"/>
+              </a:ext>
+            </a:extLst>
+          </a:blip>
+          <a:stretch>
+            <a:fillRect/>
+          </a:stretch>
+        </p:blipFill>
+        <p:spPr>
+          <a:xfrm>
+            <a:off x="9795113" y="4183762"/>
+            <a:ext cx="914400" cy="914400"/>
+          </a:xfrm>
+          <a:prstGeom prst="rect">
+            <a:avLst/>
+          </a:prstGeom>
+        </p:spPr>
+      </p:pic>
+      <p:grpSp>
+        <p:nvGrpSpPr>
+          <p:cNvPr id="12" name="Group 11">
+            <a:extLst>
+              <a:ext uri="{FF2B5EF4-FFF2-40B4-BE49-F238E27FC236}">
+                <a16:creationId xmlns:a16="http://schemas.microsoft.com/office/drawing/2014/main" id="{E737830F-1639-57AD-135B-55790BD6883B}"/>
+              </a:ext>
+            </a:extLst>
+          </p:cNvPr>
+          <p:cNvGrpSpPr/>
+          <p:nvPr/>
+        </p:nvGrpSpPr>
+        <p:grpSpPr>
+          <a:xfrm>
+            <a:off x="8970983" y="417016"/>
+            <a:ext cx="907218" cy="907218"/>
+            <a:chOff x="9937216" y="790834"/>
+            <a:chExt cx="907218" cy="907218"/>
+          </a:xfrm>
+        </p:grpSpPr>
+        <p:sp>
+          <p:nvSpPr>
+            <p:cNvPr id="10" name="Rounded Rectangle 9">
+              <a:extLst>
+                <a:ext uri="{FF2B5EF4-FFF2-40B4-BE49-F238E27FC236}">
+                  <a16:creationId xmlns:a16="http://schemas.microsoft.com/office/drawing/2014/main" id="{F6B61F81-E910-B2EB-E6CE-65229B267704}"/>
+                </a:ext>
+              </a:extLst>
+            </p:cNvPr>
+            <p:cNvSpPr/>
+            <p:nvPr/>
+          </p:nvSpPr>
+          <p:spPr>
+            <a:xfrm>
+              <a:off x="9937216" y="790834"/>
+              <a:ext cx="907218" cy="907218"/>
+            </a:xfrm>
+            <a:prstGeom prst="roundRect">
+              <a:avLst/>
+            </a:prstGeom>
+            <a:noFill/>
+            <a:ln w="127000">
+              <a:solidFill>
+                <a:schemeClr val="bg1"/>
+              </a:solidFill>
+            </a:ln>
+          </p:spPr>
+          <p:style>
+            <a:lnRef idx="2">
+              <a:schemeClr val="accent1">
+                <a:shade val="15000"/>
+              </a:schemeClr>
+            </a:lnRef>
+            <a:fillRef idx="1">
+              <a:schemeClr val="accent1"/>
+            </a:fillRef>
+            <a:effectRef idx="0">
+              <a:schemeClr val="accent1"/>
+            </a:effectRef>
+            <a:fontRef idx="minor">
+              <a:schemeClr val="lt1"/>
+            </a:fontRef>
+          </p:style>
+          <p:txBody>
+            <a:bodyPr rtlCol="0" anchor="ctr"/>
+            <a:lstStyle/>
+            <a:p>
+              <a:pPr algn="ctr"/>
+              <a:endParaRPr lang="en-US"/>
+            </a:p>
+          </p:txBody>
+        </p:sp>
+        <p:sp>
+          <p:nvSpPr>
+            <p:cNvPr id="4" name="Rounded Rectangle 3">
+              <a:extLst>
+                <a:ext uri="{FF2B5EF4-FFF2-40B4-BE49-F238E27FC236}">
+                  <a16:creationId xmlns:a16="http://schemas.microsoft.com/office/drawing/2014/main" id="{0DD81F1C-9589-86A0-7690-61D2BA3FA605}"/>
+                </a:ext>
+              </a:extLst>
+            </p:cNvPr>
+            <p:cNvSpPr/>
+            <p:nvPr/>
+          </p:nvSpPr>
+          <p:spPr>
+            <a:xfrm>
+              <a:off x="10083114" y="939114"/>
+              <a:ext cx="630193" cy="630193"/>
+            </a:xfrm>
+            <a:prstGeom prst="roundRect">
+              <a:avLst/>
+            </a:prstGeom>
+            <a:noFill/>
+            <a:ln w="127000">
+              <a:solidFill>
+                <a:schemeClr val="tx1"/>
+              </a:solidFill>
+            </a:ln>
+          </p:spPr>
+          <p:style>
+            <a:lnRef idx="2">
+              <a:schemeClr val="accent1">
+                <a:shade val="15000"/>
+              </a:schemeClr>
+            </a:lnRef>
+            <a:fillRef idx="1">
+              <a:schemeClr val="accent1"/>
+            </a:fillRef>
+            <a:effectRef idx="0">
+              <a:schemeClr val="accent1"/>
+            </a:effectRef>
+            <a:fontRef idx="minor">
+              <a:schemeClr val="lt1"/>
+            </a:fontRef>
+          </p:style>
+          <p:txBody>
+            <a:bodyPr rtlCol="0" anchor="ctr"/>
+            <a:lstStyle/>
+            <a:p>
+              <a:pPr algn="ctr"/>
+              <a:endParaRPr lang="en-US"/>
+            </a:p>
+          </p:txBody>
+        </p:sp>
+      </p:grpSp>
+      <p:grpSp>
+        <p:nvGrpSpPr>
+          <p:cNvPr id="16" name="Group 15">
+            <a:extLst>
+              <a:ext uri="{FF2B5EF4-FFF2-40B4-BE49-F238E27FC236}">
+                <a16:creationId xmlns:a16="http://schemas.microsoft.com/office/drawing/2014/main" id="{664C9D55-A09D-6D99-B34C-F0F458B0203B}"/>
+              </a:ext>
+            </a:extLst>
+          </p:cNvPr>
+          <p:cNvGrpSpPr/>
+          <p:nvPr/>
+        </p:nvGrpSpPr>
+        <p:grpSpPr>
+          <a:xfrm>
+            <a:off x="10697542" y="1476633"/>
+            <a:ext cx="1350295" cy="1353064"/>
+            <a:chOff x="10697542" y="1476633"/>
+            <a:chExt cx="1350295" cy="1353064"/>
+          </a:xfrm>
+        </p:grpSpPr>
+        <p:sp>
+          <p:nvSpPr>
+            <p:cNvPr id="8" name="Rounded Rectangle 7">
+              <a:extLst>
+                <a:ext uri="{FF2B5EF4-FFF2-40B4-BE49-F238E27FC236}">
+                  <a16:creationId xmlns:a16="http://schemas.microsoft.com/office/drawing/2014/main" id="{F6CDD375-D223-47DA-1BEE-401B65C5EC0D}"/>
+                </a:ext>
+              </a:extLst>
+            </p:cNvPr>
+            <p:cNvSpPr/>
+            <p:nvPr/>
+          </p:nvSpPr>
+          <p:spPr>
+            <a:xfrm>
+              <a:off x="11214169" y="1655805"/>
+              <a:ext cx="630193" cy="827902"/>
+            </a:xfrm>
+            <a:prstGeom prst="roundRect">
+              <a:avLst/>
+            </a:prstGeom>
+            <a:noFill/>
+            <a:ln w="127000">
+              <a:solidFill>
+                <a:schemeClr val="tx1"/>
+              </a:solidFill>
+            </a:ln>
+          </p:spPr>
+          <p:style>
+            <a:lnRef idx="2">
+              <a:schemeClr val="accent1">
+                <a:shade val="15000"/>
+              </a:schemeClr>
+            </a:lnRef>
+            <a:fillRef idx="1">
+              <a:schemeClr val="accent1"/>
+            </a:fillRef>
+            <a:effectRef idx="0">
+              <a:schemeClr val="accent1"/>
+            </a:effectRef>
+            <a:fontRef idx="minor">
+              <a:schemeClr val="lt1"/>
+            </a:fontRef>
+          </p:style>
+          <p:txBody>
+            <a:bodyPr rtlCol="0" anchor="ctr"/>
+            <a:lstStyle/>
+            <a:p>
+              <a:pPr algn="ctr"/>
+              <a:endParaRPr lang="en-US"/>
+            </a:p>
+          </p:txBody>
+        </p:sp>
+        <p:sp>
+          <p:nvSpPr>
+            <p:cNvPr id="6" name="Rounded Rectangle 5">
+              <a:extLst>
+                <a:ext uri="{FF2B5EF4-FFF2-40B4-BE49-F238E27FC236}">
+                  <a16:creationId xmlns:a16="http://schemas.microsoft.com/office/drawing/2014/main" id="{65E4E9A1-DF26-27A9-9A27-1C6013E245F8}"/>
+                </a:ext>
+              </a:extLst>
+            </p:cNvPr>
+            <p:cNvSpPr/>
+            <p:nvPr/>
+          </p:nvSpPr>
+          <p:spPr>
+            <a:xfrm>
+              <a:off x="10901454" y="1853514"/>
+              <a:ext cx="630193" cy="827902"/>
+            </a:xfrm>
+            <a:prstGeom prst="roundRect">
+              <a:avLst/>
+            </a:prstGeom>
+            <a:solidFill>
+              <a:schemeClr val="bg1"/>
+            </a:solidFill>
+            <a:ln w="127000">
+              <a:solidFill>
+                <a:schemeClr val="tx1"/>
+              </a:solidFill>
+            </a:ln>
+          </p:spPr>
+          <p:style>
+            <a:lnRef idx="2">
+              <a:schemeClr val="accent1">
+                <a:shade val="15000"/>
+              </a:schemeClr>
+            </a:lnRef>
+            <a:fillRef idx="1">
+              <a:schemeClr val="accent1"/>
+            </a:fillRef>
+            <a:effectRef idx="0">
+              <a:schemeClr val="accent1"/>
+            </a:effectRef>
+            <a:fontRef idx="minor">
+              <a:schemeClr val="lt1"/>
+            </a:fontRef>
+          </p:style>
+          <p:txBody>
+            <a:bodyPr rtlCol="0" anchor="ctr"/>
+            <a:lstStyle/>
+            <a:p>
+              <a:pPr algn="ctr"/>
+              <a:endParaRPr lang="en-US"/>
+            </a:p>
+          </p:txBody>
+        </p:sp>
+        <p:sp>
+          <p:nvSpPr>
+            <p:cNvPr id="14" name="Rounded Rectangle 13">
+              <a:extLst>
+                <a:ext uri="{FF2B5EF4-FFF2-40B4-BE49-F238E27FC236}">
+                  <a16:creationId xmlns:a16="http://schemas.microsoft.com/office/drawing/2014/main" id="{DF387B78-9C3B-5196-1EAA-7668B62B80D4}"/>
+                </a:ext>
+              </a:extLst>
+            </p:cNvPr>
+            <p:cNvSpPr/>
+            <p:nvPr/>
+          </p:nvSpPr>
+          <p:spPr>
+            <a:xfrm>
+              <a:off x="10697542" y="1476633"/>
+              <a:ext cx="1350295" cy="1353064"/>
+            </a:xfrm>
+            <a:prstGeom prst="roundRect">
+              <a:avLst/>
+            </a:prstGeom>
+            <a:noFill/>
+            <a:ln w="76200">
+              <a:solidFill>
+                <a:schemeClr val="bg1"/>
+              </a:solidFill>
+            </a:ln>
+          </p:spPr>
+          <p:style>
+            <a:lnRef idx="2">
+              <a:schemeClr val="accent1">
+                <a:shade val="15000"/>
+              </a:schemeClr>
+            </a:lnRef>
+            <a:fillRef idx="1">
+              <a:schemeClr val="accent1"/>
+            </a:fillRef>
+            <a:effectRef idx="0">
+              <a:schemeClr val="accent1"/>
+            </a:effectRef>
+            <a:fontRef idx="minor">
+              <a:schemeClr val="lt1"/>
+            </a:fontRef>
+          </p:style>
+          <p:txBody>
+            <a:bodyPr rtlCol="0" anchor="ctr"/>
+            <a:lstStyle/>
+            <a:p>
+              <a:pPr algn="ctr"/>
+              <a:endParaRPr lang="en-US"/>
+            </a:p>
+          </p:txBody>
+        </p:sp>
+      </p:grpSp>
     </p:spTree>
     <p:extLst>
       <p:ext uri="{BB962C8B-B14F-4D97-AF65-F5344CB8AC3E}">

</xml_diff>

<commit_message>
Add URL for google icons to Power Point
</commit_message>
<xml_diff>
--- a/src/QSviz/resources/icons.pptx
+++ b/src/QSviz/resources/icons.pptx
@@ -3342,7 +3342,7 @@
         </p:nvGrpSpPr>
         <p:grpSpPr>
           <a:xfrm>
-            <a:off x="679619" y="597856"/>
+            <a:off x="2607810" y="2739162"/>
             <a:ext cx="2034652" cy="2206705"/>
             <a:chOff x="679619" y="597856"/>
             <a:chExt cx="2034652" cy="2206705"/>
@@ -3643,7 +3643,7 @@
         </p:blipFill>
         <p:spPr>
           <a:xfrm flipH="1">
-            <a:off x="7184878" y="2350018"/>
+            <a:off x="8113958" y="4980977"/>
             <a:ext cx="2093057" cy="2093057"/>
           </a:xfrm>
           <a:prstGeom prst="rect">
@@ -3689,7 +3689,7 @@
         </p:blipFill>
         <p:spPr bwMode="auto">
           <a:xfrm>
-            <a:off x="6133318" y="246898"/>
+            <a:off x="6898631" y="1859655"/>
             <a:ext cx="2103120" cy="2103120"/>
           </a:xfrm>
           <a:prstGeom prst="rect">
@@ -3735,7 +3735,7 @@
         </p:blipFill>
         <p:spPr>
           <a:xfrm>
-            <a:off x="4113503" y="1446503"/>
+            <a:off x="4712250" y="2927887"/>
             <a:ext cx="2439697" cy="2439697"/>
           </a:xfrm>
           <a:prstGeom prst="rect">
@@ -3849,6 +3849,57 @@
           </a:prstGeom>
         </p:spPr>
       </p:pic>
+      <p:sp>
+        <p:nvSpPr>
+          <p:cNvPr id="3" name="TextBox 2">
+            <a:extLst>
+              <a:ext uri="{FF2B5EF4-FFF2-40B4-BE49-F238E27FC236}">
+                <a16:creationId xmlns:a16="http://schemas.microsoft.com/office/drawing/2014/main" id="{1525D615-7217-4D10-7922-EA00DFD2FEC1}"/>
+              </a:ext>
+            </a:extLst>
+          </p:cNvPr>
+          <p:cNvSpPr txBox="1"/>
+          <p:nvPr/>
+        </p:nvSpPr>
+        <p:spPr>
+          <a:xfrm>
+            <a:off x="389504" y="475845"/>
+            <a:ext cx="6097656" cy="646331"/>
+          </a:xfrm>
+          <a:prstGeom prst="rect">
+            <a:avLst/>
+          </a:prstGeom>
+          <a:noFill/>
+        </p:spPr>
+        <p:txBody>
+          <a:bodyPr wrap="square">
+            <a:spAutoFit/>
+          </a:bodyPr>
+          <a:lstStyle/>
+          <a:p>
+            <a:r>
+              <a:rPr lang="en-US" dirty="0"/>
+              <a:t>https://</a:t>
+            </a:r>
+            <a:r>
+              <a:rPr lang="en-US" dirty="0" err="1"/>
+              <a:t>fonts.google.com</a:t>
+            </a:r>
+            <a:r>
+              <a:rPr lang="en-US" dirty="0"/>
+              <a:t>/</a:t>
+            </a:r>
+            <a:r>
+              <a:rPr lang="en-US" dirty="0" err="1"/>
+              <a:t>icons?icon.size</a:t>
+            </a:r>
+            <a:r>
+              <a:rPr lang="en-US" dirty="0"/>
+              <a:t>=24&amp;icon.color=%231f1f1f</a:t>
+            </a:r>
+          </a:p>
+        </p:txBody>
+      </p:sp>
     </p:spTree>
     <p:extLst>
       <p:ext uri="{BB962C8B-B14F-4D97-AF65-F5344CB8AC3E}">

</xml_diff>